<commit_message>
Advisor Update to Powerpoint
Dr. Rodriguez added to first slide
</commit_message>
<xml_diff>
--- a/Documentation/Presentation/Design Powerpoint.pptx
+++ b/Documentation/Presentation/Design Powerpoint.pptx
@@ -4424,7 +4424,7 @@
           <a:p>
             <a:fld id="{48A87A34-81AB-432B-8DAE-1953F412C126}" type="datetimeFigureOut">
               <a:rPr lang="en-US" dirty="0"/>
-              <a:t>1/12/2015</a:t>
+              <a:t>1/13/2015</a:t>
             </a:fld>
             <a:endParaRPr lang="en-US" dirty="0"/>
           </a:p>
@@ -4686,7 +4686,7 @@
           <a:p>
             <a:fld id="{48A87A34-81AB-432B-8DAE-1953F412C126}" type="datetimeFigureOut">
               <a:rPr lang="en-US" dirty="0"/>
-              <a:t>1/12/2015</a:t>
+              <a:t>1/13/2015</a:t>
             </a:fld>
             <a:endParaRPr lang="en-US" dirty="0"/>
           </a:p>
@@ -4877,7 +4877,7 @@
           <a:p>
             <a:fld id="{48A87A34-81AB-432B-8DAE-1953F412C126}" type="datetimeFigureOut">
               <a:rPr lang="en-US" dirty="0"/>
-              <a:t>1/12/2015</a:t>
+              <a:t>1/13/2015</a:t>
             </a:fld>
             <a:endParaRPr lang="en-US" dirty="0"/>
           </a:p>
@@ -5135,7 +5135,7 @@
           <a:p>
             <a:fld id="{48A87A34-81AB-432B-8DAE-1953F412C126}" type="datetimeFigureOut">
               <a:rPr lang="en-US" dirty="0"/>
-              <a:t>1/12/2015</a:t>
+              <a:t>1/13/2015</a:t>
             </a:fld>
             <a:endParaRPr lang="en-US" dirty="0"/>
           </a:p>
@@ -5564,7 +5564,7 @@
           <a:p>
             <a:fld id="{48A87A34-81AB-432B-8DAE-1953F412C126}" type="datetimeFigureOut">
               <a:rPr lang="en-US" dirty="0"/>
-              <a:t>1/12/2015</a:t>
+              <a:t>1/13/2015</a:t>
             </a:fld>
             <a:endParaRPr lang="en-US" dirty="0"/>
           </a:p>
@@ -6105,7 +6105,7 @@
           <a:p>
             <a:fld id="{48A87A34-81AB-432B-8DAE-1953F412C126}" type="datetimeFigureOut">
               <a:rPr lang="en-US" dirty="0"/>
-              <a:t>1/12/2015</a:t>
+              <a:t>1/13/2015</a:t>
             </a:fld>
             <a:endParaRPr lang="en-US" dirty="0"/>
           </a:p>
@@ -6820,7 +6820,7 @@
           <a:p>
             <a:fld id="{48A87A34-81AB-432B-8DAE-1953F412C126}" type="datetimeFigureOut">
               <a:rPr lang="en-US" dirty="0"/>
-              <a:t>1/12/2015</a:t>
+              <a:t>1/13/2015</a:t>
             </a:fld>
             <a:endParaRPr lang="en-US" dirty="0"/>
           </a:p>
@@ -6985,7 +6985,7 @@
           <a:p>
             <a:fld id="{48A87A34-81AB-432B-8DAE-1953F412C126}" type="datetimeFigureOut">
               <a:rPr lang="en-US" dirty="0"/>
-              <a:t>1/12/2015</a:t>
+              <a:t>1/13/2015</a:t>
             </a:fld>
             <a:endParaRPr lang="en-US" dirty="0"/>
           </a:p>
@@ -7160,7 +7160,7 @@
           <a:p>
             <a:fld id="{48A87A34-81AB-432B-8DAE-1953F412C126}" type="datetimeFigureOut">
               <a:rPr lang="en-US" dirty="0"/>
-              <a:t>1/12/2015</a:t>
+              <a:t>1/13/2015</a:t>
             </a:fld>
             <a:endParaRPr lang="en-US" dirty="0"/>
           </a:p>
@@ -7325,7 +7325,7 @@
           <a:p>
             <a:fld id="{48A87A34-81AB-432B-8DAE-1953F412C126}" type="datetimeFigureOut">
               <a:rPr lang="en-US" dirty="0"/>
-              <a:t>1/12/2015</a:t>
+              <a:t>1/13/2015</a:t>
             </a:fld>
             <a:endParaRPr lang="en-US" dirty="0"/>
           </a:p>
@@ -7570,7 +7570,7 @@
           <a:p>
             <a:fld id="{48A87A34-81AB-432B-8DAE-1953F412C126}" type="datetimeFigureOut">
               <a:rPr lang="en-US" dirty="0"/>
-              <a:t>1/12/2015</a:t>
+              <a:t>1/13/2015</a:t>
             </a:fld>
             <a:endParaRPr lang="en-US" dirty="0"/>
           </a:p>
@@ -7797,7 +7797,7 @@
           <a:p>
             <a:fld id="{48A87A34-81AB-432B-8DAE-1953F412C126}" type="datetimeFigureOut">
               <a:rPr lang="en-US" dirty="0"/>
-              <a:t>1/12/2015</a:t>
+              <a:t>1/13/2015</a:t>
             </a:fld>
             <a:endParaRPr lang="en-US" dirty="0"/>
           </a:p>
@@ -8173,7 +8173,7 @@
           <a:p>
             <a:fld id="{48A87A34-81AB-432B-8DAE-1953F412C126}" type="datetimeFigureOut">
               <a:rPr lang="en-US" dirty="0"/>
-              <a:t>1/12/2015</a:t>
+              <a:t>1/13/2015</a:t>
             </a:fld>
             <a:endParaRPr lang="en-US" dirty="0"/>
           </a:p>
@@ -8286,7 +8286,7 @@
           <a:p>
             <a:fld id="{48A87A34-81AB-432B-8DAE-1953F412C126}" type="datetimeFigureOut">
               <a:rPr lang="en-US" dirty="0"/>
-              <a:t>1/12/2015</a:t>
+              <a:t>1/13/2015</a:t>
             </a:fld>
             <a:endParaRPr lang="en-US" dirty="0"/>
           </a:p>
@@ -8376,7 +8376,7 @@
           <a:p>
             <a:fld id="{48A87A34-81AB-432B-8DAE-1953F412C126}" type="datetimeFigureOut">
               <a:rPr lang="en-US" dirty="0"/>
-              <a:t>1/12/2015</a:t>
+              <a:t>1/13/2015</a:t>
             </a:fld>
             <a:endParaRPr lang="en-US" dirty="0"/>
           </a:p>
@@ -8620,7 +8620,7 @@
           <a:p>
             <a:fld id="{48A87A34-81AB-432B-8DAE-1953F412C126}" type="datetimeFigureOut">
               <a:rPr lang="en-US" dirty="0"/>
-              <a:t>1/12/2015</a:t>
+              <a:t>1/13/2015</a:t>
             </a:fld>
             <a:endParaRPr lang="en-US" dirty="0"/>
           </a:p>
@@ -8895,7 +8895,7 @@
           <a:p>
             <a:fld id="{48A87A34-81AB-432B-8DAE-1953F412C126}" type="datetimeFigureOut">
               <a:rPr lang="en-US" dirty="0"/>
-              <a:t>1/12/2015</a:t>
+              <a:t>1/13/2015</a:t>
             </a:fld>
             <a:endParaRPr lang="en-US" dirty="0"/>
           </a:p>
@@ -11958,7 +11958,7 @@
             <a:fld id="{48A87A34-81AB-432B-8DAE-1953F412C126}" type="datetimeFigureOut">
               <a:rPr lang="en-US" dirty="0"/>
               <a:pPr/>
-              <a:t>1/12/2015</a:t>
+              <a:t>1/13/2015</a:t>
             </a:fld>
             <a:endParaRPr lang="en-US" dirty="0"/>
           </a:p>
@@ -12409,16 +12409,31 @@
             <p:ph type="subTitle" idx="1"/>
           </p:nvPr>
         </p:nvSpPr>
-        <p:spPr/>
+        <p:spPr>
+          <a:xfrm>
+            <a:off x="1982559" y="3593874"/>
+            <a:ext cx="8791575" cy="2578326"/>
+          </a:xfrm>
+        </p:spPr>
         <p:txBody>
           <a:bodyPr>
-            <a:normAutofit fontScale="92500" lnSpcReduction="20000"/>
+            <a:normAutofit/>
           </a:bodyPr>
           <a:lstStyle/>
           <a:p>
             <a:r>
               <a:rPr lang="en-US" dirty="0" smtClean="0"/>
-              <a:t>Logan Beaver - ME</a:t>
+              <a:t>Advisor: Dr. Rodriguez</a:t>
+            </a:r>
+          </a:p>
+          <a:p>
+            <a:r>
+              <a:rPr lang="en-US" dirty="0" smtClean="0"/>
+              <a:t>Logan </a:t>
+            </a:r>
+            <a:r>
+              <a:rPr lang="en-US" dirty="0" smtClean="0"/>
+              <a:t>Beaver - ME</a:t>
             </a:r>
           </a:p>
           <a:p>
@@ -12430,19 +12445,20 @@
           <a:p>
             <a:r>
               <a:rPr lang="en-US" dirty="0" smtClean="0"/>
-              <a:t>Tyler Paddock </a:t>
-            </a:r>
+              <a:t>Tyler Paddock – CE/EE</a:t>
+            </a:r>
+          </a:p>
+          <a:p>
             <a:r>
               <a:rPr lang="en-US" dirty="0" smtClean="0"/>
-              <a:t>– CE/EE</a:t>
-            </a:r>
-            <a:endParaRPr lang="en-US" dirty="0" smtClean="0"/>
-          </a:p>
-          <a:p>
+              <a:t>Ronald Shipman </a:t>
+            </a:r>
             <a:r>
               <a:rPr lang="en-US" dirty="0" smtClean="0"/>
-              <a:t>Ronald Shipman - ME</a:t>
-            </a:r>
+              <a:t>– ME</a:t>
+            </a:r>
+          </a:p>
+          <a:p>
             <a:endParaRPr lang="en-US" dirty="0"/>
           </a:p>
         </p:txBody>

</xml_diff>

<commit_message>
Matlab files and progress report
</commit_message>
<xml_diff>
--- a/Documentation/Presentation/Design Powerpoint.pptx
+++ b/Documentation/Presentation/Design Powerpoint.pptx
@@ -4424,7 +4424,7 @@
           <a:p>
             <a:fld id="{48A87A34-81AB-432B-8DAE-1953F412C126}" type="datetimeFigureOut">
               <a:rPr lang="en-US" dirty="0"/>
-              <a:t>1/12/2015</a:t>
+              <a:t>1/13/2015</a:t>
             </a:fld>
             <a:endParaRPr lang="en-US" dirty="0"/>
           </a:p>
@@ -4686,7 +4686,7 @@
           <a:p>
             <a:fld id="{48A87A34-81AB-432B-8DAE-1953F412C126}" type="datetimeFigureOut">
               <a:rPr lang="en-US" dirty="0"/>
-              <a:t>1/12/2015</a:t>
+              <a:t>1/13/2015</a:t>
             </a:fld>
             <a:endParaRPr lang="en-US" dirty="0"/>
           </a:p>
@@ -4877,7 +4877,7 @@
           <a:p>
             <a:fld id="{48A87A34-81AB-432B-8DAE-1953F412C126}" type="datetimeFigureOut">
               <a:rPr lang="en-US" dirty="0"/>
-              <a:t>1/12/2015</a:t>
+              <a:t>1/13/2015</a:t>
             </a:fld>
             <a:endParaRPr lang="en-US" dirty="0"/>
           </a:p>
@@ -5135,7 +5135,7 @@
           <a:p>
             <a:fld id="{48A87A34-81AB-432B-8DAE-1953F412C126}" type="datetimeFigureOut">
               <a:rPr lang="en-US" dirty="0"/>
-              <a:t>1/12/2015</a:t>
+              <a:t>1/13/2015</a:t>
             </a:fld>
             <a:endParaRPr lang="en-US" dirty="0"/>
           </a:p>
@@ -5564,7 +5564,7 @@
           <a:p>
             <a:fld id="{48A87A34-81AB-432B-8DAE-1953F412C126}" type="datetimeFigureOut">
               <a:rPr lang="en-US" dirty="0"/>
-              <a:t>1/12/2015</a:t>
+              <a:t>1/13/2015</a:t>
             </a:fld>
             <a:endParaRPr lang="en-US" dirty="0"/>
           </a:p>
@@ -6105,7 +6105,7 @@
           <a:p>
             <a:fld id="{48A87A34-81AB-432B-8DAE-1953F412C126}" type="datetimeFigureOut">
               <a:rPr lang="en-US" dirty="0"/>
-              <a:t>1/12/2015</a:t>
+              <a:t>1/13/2015</a:t>
             </a:fld>
             <a:endParaRPr lang="en-US" dirty="0"/>
           </a:p>
@@ -6820,7 +6820,7 @@
           <a:p>
             <a:fld id="{48A87A34-81AB-432B-8DAE-1953F412C126}" type="datetimeFigureOut">
               <a:rPr lang="en-US" dirty="0"/>
-              <a:t>1/12/2015</a:t>
+              <a:t>1/13/2015</a:t>
             </a:fld>
             <a:endParaRPr lang="en-US" dirty="0"/>
           </a:p>
@@ -6985,7 +6985,7 @@
           <a:p>
             <a:fld id="{48A87A34-81AB-432B-8DAE-1953F412C126}" type="datetimeFigureOut">
               <a:rPr lang="en-US" dirty="0"/>
-              <a:t>1/12/2015</a:t>
+              <a:t>1/13/2015</a:t>
             </a:fld>
             <a:endParaRPr lang="en-US" dirty="0"/>
           </a:p>
@@ -7160,7 +7160,7 @@
           <a:p>
             <a:fld id="{48A87A34-81AB-432B-8DAE-1953F412C126}" type="datetimeFigureOut">
               <a:rPr lang="en-US" dirty="0"/>
-              <a:t>1/12/2015</a:t>
+              <a:t>1/13/2015</a:t>
             </a:fld>
             <a:endParaRPr lang="en-US" dirty="0"/>
           </a:p>
@@ -7325,7 +7325,7 @@
           <a:p>
             <a:fld id="{48A87A34-81AB-432B-8DAE-1953F412C126}" type="datetimeFigureOut">
               <a:rPr lang="en-US" dirty="0"/>
-              <a:t>1/12/2015</a:t>
+              <a:t>1/13/2015</a:t>
             </a:fld>
             <a:endParaRPr lang="en-US" dirty="0"/>
           </a:p>
@@ -7570,7 +7570,7 @@
           <a:p>
             <a:fld id="{48A87A34-81AB-432B-8DAE-1953F412C126}" type="datetimeFigureOut">
               <a:rPr lang="en-US" dirty="0"/>
-              <a:t>1/12/2015</a:t>
+              <a:t>1/13/2015</a:t>
             </a:fld>
             <a:endParaRPr lang="en-US" dirty="0"/>
           </a:p>
@@ -7797,7 +7797,7 @@
           <a:p>
             <a:fld id="{48A87A34-81AB-432B-8DAE-1953F412C126}" type="datetimeFigureOut">
               <a:rPr lang="en-US" dirty="0"/>
-              <a:t>1/12/2015</a:t>
+              <a:t>1/13/2015</a:t>
             </a:fld>
             <a:endParaRPr lang="en-US" dirty="0"/>
           </a:p>
@@ -8173,7 +8173,7 @@
           <a:p>
             <a:fld id="{48A87A34-81AB-432B-8DAE-1953F412C126}" type="datetimeFigureOut">
               <a:rPr lang="en-US" dirty="0"/>
-              <a:t>1/12/2015</a:t>
+              <a:t>1/13/2015</a:t>
             </a:fld>
             <a:endParaRPr lang="en-US" dirty="0"/>
           </a:p>
@@ -8286,7 +8286,7 @@
           <a:p>
             <a:fld id="{48A87A34-81AB-432B-8DAE-1953F412C126}" type="datetimeFigureOut">
               <a:rPr lang="en-US" dirty="0"/>
-              <a:t>1/12/2015</a:t>
+              <a:t>1/13/2015</a:t>
             </a:fld>
             <a:endParaRPr lang="en-US" dirty="0"/>
           </a:p>
@@ -8376,7 +8376,7 @@
           <a:p>
             <a:fld id="{48A87A34-81AB-432B-8DAE-1953F412C126}" type="datetimeFigureOut">
               <a:rPr lang="en-US" dirty="0"/>
-              <a:t>1/12/2015</a:t>
+              <a:t>1/13/2015</a:t>
             </a:fld>
             <a:endParaRPr lang="en-US" dirty="0"/>
           </a:p>
@@ -8620,7 +8620,7 @@
           <a:p>
             <a:fld id="{48A87A34-81AB-432B-8DAE-1953F412C126}" type="datetimeFigureOut">
               <a:rPr lang="en-US" dirty="0"/>
-              <a:t>1/12/2015</a:t>
+              <a:t>1/13/2015</a:t>
             </a:fld>
             <a:endParaRPr lang="en-US" dirty="0"/>
           </a:p>
@@ -8895,7 +8895,7 @@
           <a:p>
             <a:fld id="{48A87A34-81AB-432B-8DAE-1953F412C126}" type="datetimeFigureOut">
               <a:rPr lang="en-US" dirty="0"/>
-              <a:t>1/12/2015</a:t>
+              <a:t>1/13/2015</a:t>
             </a:fld>
             <a:endParaRPr lang="en-US" dirty="0"/>
           </a:p>
@@ -11958,7 +11958,7 @@
             <a:fld id="{48A87A34-81AB-432B-8DAE-1953F412C126}" type="datetimeFigureOut">
               <a:rPr lang="en-US" dirty="0"/>
               <a:pPr/>
-              <a:t>1/12/2015</a:t>
+              <a:t>1/13/2015</a:t>
             </a:fld>
             <a:endParaRPr lang="en-US" dirty="0"/>
           </a:p>
@@ -12409,10 +12409,15 @@
             <p:ph type="subTitle" idx="1"/>
           </p:nvPr>
         </p:nvSpPr>
-        <p:spPr/>
+        <p:spPr>
+          <a:xfrm>
+            <a:off x="1876424" y="3602037"/>
+            <a:ext cx="8791575" cy="2401947"/>
+          </a:xfrm>
+        </p:spPr>
         <p:txBody>
           <a:bodyPr>
-            <a:normAutofit fontScale="92500" lnSpcReduction="20000"/>
+            <a:normAutofit lnSpcReduction="10000"/>
           </a:bodyPr>
           <a:lstStyle/>
           <a:p>
@@ -12430,18 +12435,31 @@
           <a:p>
             <a:r>
               <a:rPr lang="en-US" dirty="0" smtClean="0"/>
-              <a:t>Tyler Paddock </a:t>
-            </a:r>
+              <a:t>Tyler Paddock – CE/EE</a:t>
+            </a:r>
+          </a:p>
+          <a:p>
             <a:r>
               <a:rPr lang="en-US" dirty="0" smtClean="0"/>
-              <a:t>– CE/EE</a:t>
-            </a:r>
-            <a:endParaRPr lang="en-US" dirty="0" smtClean="0"/>
-          </a:p>
-          <a:p>
+              <a:t>Ronald Shipman </a:t>
+            </a:r>
             <a:r>
               <a:rPr lang="en-US" dirty="0" smtClean="0"/>
-              <a:t>Ronald Shipman - ME</a:t>
+              <a:t>– ME</a:t>
+            </a:r>
+          </a:p>
+          <a:p>
+            <a:r>
+              <a:rPr lang="en-US" dirty="0" smtClean="0"/>
+              <a:t>Dr</a:t>
+            </a:r>
+            <a:r>
+              <a:rPr lang="en-US" dirty="0"/>
+              <a:t>.</a:t>
+            </a:r>
+            <a:r>
+              <a:rPr lang="en-US" dirty="0" smtClean="0"/>
+              <a:t> Luis Rodriguez – advisor</a:t>
             </a:r>
             <a:endParaRPr lang="en-US" dirty="0"/>
           </a:p>
@@ -13107,8 +13125,8 @@
           </a:p>
         </p:txBody>
       </p:sp>
-      <mc:AlternateContent xmlns:mc="http://schemas.openxmlformats.org/markup-compatibility/2006" xmlns:a14="http://schemas.microsoft.com/office/drawing/2010/main">
-        <mc:Choice Requires="a14">
+      <mc:AlternateContent xmlns:mc="http://schemas.openxmlformats.org/markup-compatibility/2006">
+        <mc:Choice xmlns:a14="http://schemas.microsoft.com/office/drawing/2010/main" Requires="a14">
           <p:sp>
             <p:nvSpPr>
               <p:cNvPr id="10" name="Content Placeholder 2"/>
@@ -13344,362 +13362,461 @@
                         <m:rPr>
                           <m:nor/>
                         </m:rPr>
-                        <a:rPr lang="en-US" dirty="0"/>
+                        <a:rPr lang="en-US" dirty="0">
+                          <a:latin typeface="Cambria Math" panose="02040503050406030204" pitchFamily="18" charset="0"/>
+                        </a:rPr>
                         <m:t>LH</m:t>
                       </m:r>
                       <m:r>
                         <m:rPr>
                           <m:nor/>
                         </m:rPr>
-                        <a:rPr lang="en-US" dirty="0"/>
+                        <a:rPr lang="en-US" dirty="0">
+                          <a:latin typeface="Cambria Math" panose="02040503050406030204" pitchFamily="18" charset="0"/>
+                        </a:rPr>
                         <m:t>4∗</m:t>
                       </m:r>
                       <m:r>
                         <m:rPr>
                           <m:nor/>
                         </m:rPr>
-                        <a:rPr lang="en-US" dirty="0"/>
+                        <a:rPr lang="en-US" dirty="0">
+                          <a:latin typeface="Cambria Math" panose="02040503050406030204" pitchFamily="18" charset="0"/>
+                        </a:rPr>
                         <m:t>cos</m:t>
                       </m:r>
                       <m:r>
                         <m:rPr>
                           <m:nor/>
                         </m:rPr>
-                        <a:rPr lang="en-US" dirty="0"/>
+                        <a:rPr lang="en-US" dirty="0">
+                          <a:latin typeface="Cambria Math" panose="02040503050406030204" pitchFamily="18" charset="0"/>
+                        </a:rPr>
                         <m:t>(</m:t>
                       </m:r>
                       <m:r>
                         <m:rPr>
                           <m:nor/>
                         </m:rPr>
-                        <a:rPr lang="en-US" dirty="0"/>
+                        <a:rPr lang="en-US" dirty="0">
+                          <a:latin typeface="Cambria Math" panose="02040503050406030204" pitchFamily="18" charset="0"/>
+                        </a:rPr>
                         <m:t>tb</m:t>
                       </m:r>
                       <m:r>
                         <m:rPr>
                           <m:nor/>
                         </m:rPr>
-                        <a:rPr lang="en-US" dirty="0"/>
+                        <a:rPr lang="en-US" dirty="0">
+                          <a:latin typeface="Cambria Math" panose="02040503050406030204" pitchFamily="18" charset="0"/>
+                        </a:rPr>
                         <m:t>)∗</m:t>
                       </m:r>
                       <m:r>
                         <m:rPr>
                           <m:nor/>
                         </m:rPr>
-                        <a:rPr lang="en-US" dirty="0"/>
+                        <a:rPr lang="en-US" dirty="0">
+                          <a:latin typeface="Cambria Math" panose="02040503050406030204" pitchFamily="18" charset="0"/>
+                        </a:rPr>
                         <m:t>tbdot</m:t>
                       </m:r>
                       <m:r>
                         <m:rPr>
                           <m:nor/>
                         </m:rPr>
-                        <a:rPr lang="en-US" dirty="0"/>
+                        <a:rPr lang="en-US" dirty="0">
+                          <a:latin typeface="Cambria Math" panose="02040503050406030204" pitchFamily="18" charset="0"/>
+                        </a:rPr>
                         <m:t>^2 − </m:t>
                       </m:r>
                       <m:r>
                         <m:rPr>
                           <m:nor/>
                         </m:rPr>
-                        <a:rPr lang="en-US" dirty="0"/>
+                        <a:rPr lang="en-US" dirty="0">
+                          <a:latin typeface="Cambria Math" panose="02040503050406030204" pitchFamily="18" charset="0"/>
+                        </a:rPr>
                         <m:t>LK</m:t>
                       </m:r>
                       <m:r>
                         <m:rPr>
                           <m:nor/>
                         </m:rPr>
-                        <a:rPr lang="en-US" dirty="0"/>
+                        <a:rPr lang="en-US" dirty="0">
+                          <a:latin typeface="Cambria Math" panose="02040503050406030204" pitchFamily="18" charset="0"/>
+                        </a:rPr>
                         <m:t>4∗</m:t>
                       </m:r>
                       <m:r>
                         <m:rPr>
                           <m:nor/>
                         </m:rPr>
-                        <a:rPr lang="en-US" dirty="0"/>
+                        <a:rPr lang="en-US" dirty="0">
+                          <a:latin typeface="Cambria Math" panose="02040503050406030204" pitchFamily="18" charset="0"/>
+                        </a:rPr>
                         <m:t>cos</m:t>
                       </m:r>
                       <m:r>
                         <m:rPr>
                           <m:nor/>
                         </m:rPr>
-                        <a:rPr lang="en-US" dirty="0"/>
+                        <a:rPr lang="en-US" dirty="0">
+                          <a:latin typeface="Cambria Math" panose="02040503050406030204" pitchFamily="18" charset="0"/>
+                        </a:rPr>
                         <m:t>(</m:t>
                       </m:r>
                       <m:r>
                         <m:rPr>
                           <m:nor/>
                         </m:rPr>
-                        <a:rPr lang="en-US" dirty="0"/>
+                        <a:rPr lang="en-US" dirty="0">
+                          <a:latin typeface="Cambria Math" panose="02040503050406030204" pitchFamily="18" charset="0"/>
+                        </a:rPr>
                         <m:t>th</m:t>
                       </m:r>
                       <m:r>
                         <m:rPr>
                           <m:nor/>
                         </m:rPr>
-                        <a:rPr lang="en-US" dirty="0"/>
+                        <a:rPr lang="en-US" dirty="0">
+                          <a:latin typeface="Cambria Math" panose="02040503050406030204" pitchFamily="18" charset="0"/>
+                        </a:rPr>
                         <m:t>4)∗</m:t>
                       </m:r>
                       <m:r>
                         <m:rPr>
                           <m:nor/>
                         </m:rPr>
-                        <a:rPr lang="en-US" dirty="0"/>
+                        <a:rPr lang="en-US" dirty="0">
+                          <a:latin typeface="Cambria Math" panose="02040503050406030204" pitchFamily="18" charset="0"/>
+                        </a:rPr>
                         <m:t>th</m:t>
                       </m:r>
                       <m:r>
                         <m:rPr>
                           <m:nor/>
                         </m:rPr>
-                        <a:rPr lang="en-US" dirty="0"/>
+                        <a:rPr lang="en-US" dirty="0">
+                          <a:latin typeface="Cambria Math" panose="02040503050406030204" pitchFamily="18" charset="0"/>
+                        </a:rPr>
                         <m:t>4</m:t>
                       </m:r>
                       <m:r>
                         <m:rPr>
                           <m:nor/>
                         </m:rPr>
-                        <a:rPr lang="en-US" dirty="0"/>
+                        <a:rPr lang="en-US" dirty="0">
+                          <a:latin typeface="Cambria Math" panose="02040503050406030204" pitchFamily="18" charset="0"/>
+                        </a:rPr>
                         <m:t>dot</m:t>
                       </m:r>
                       <m:r>
                         <m:rPr>
                           <m:nor/>
                         </m:rPr>
-                        <a:rPr lang="en-US" dirty="0"/>
+                        <a:rPr lang="en-US" dirty="0">
+                          <a:latin typeface="Cambria Math" panose="02040503050406030204" pitchFamily="18" charset="0"/>
+                        </a:rPr>
                         <m:t>^2 + </m:t>
                       </m:r>
                       <m:r>
                         <m:rPr>
                           <m:nor/>
                         </m:rPr>
-                        <a:rPr lang="en-US" dirty="0"/>
+                        <a:rPr lang="en-US" dirty="0">
+                          <a:latin typeface="Cambria Math" panose="02040503050406030204" pitchFamily="18" charset="0"/>
+                        </a:rPr>
                         <m:t>xddot</m:t>
                       </m:r>
                       <m:r>
                         <m:rPr>
                           <m:nor/>
                         </m:rPr>
-                        <a:rPr lang="en-US" dirty="0"/>
+                        <a:rPr lang="en-US" dirty="0">
+                          <a:latin typeface="Cambria Math" panose="02040503050406030204" pitchFamily="18" charset="0"/>
+                        </a:rPr>
                         <m:t> + </m:t>
                       </m:r>
                       <m:r>
                         <m:rPr>
                           <m:nor/>
                         </m:rPr>
-                        <a:rPr lang="en-US" dirty="0"/>
+                        <a:rPr lang="en-US" dirty="0">
+                          <a:latin typeface="Cambria Math" panose="02040503050406030204" pitchFamily="18" charset="0"/>
+                        </a:rPr>
                         <m:t>LH</m:t>
                       </m:r>
                       <m:r>
                         <m:rPr>
                           <m:nor/>
                         </m:rPr>
-                        <a:rPr lang="en-US" dirty="0"/>
+                        <a:rPr lang="en-US" dirty="0">
+                          <a:latin typeface="Cambria Math" panose="02040503050406030204" pitchFamily="18" charset="0"/>
+                        </a:rPr>
                         <m:t>4∗</m:t>
                       </m:r>
                       <m:r>
                         <m:rPr>
                           <m:nor/>
                         </m:rPr>
-                        <a:rPr lang="en-US" dirty="0"/>
+                        <a:rPr lang="en-US" dirty="0">
+                          <a:latin typeface="Cambria Math" panose="02040503050406030204" pitchFamily="18" charset="0"/>
+                        </a:rPr>
                         <m:t>tbddot</m:t>
                       </m:r>
                       <m:r>
                         <m:rPr>
                           <m:nor/>
                         </m:rPr>
-                        <a:rPr lang="en-US" dirty="0"/>
+                        <a:rPr lang="en-US" dirty="0">
+                          <a:latin typeface="Cambria Math" panose="02040503050406030204" pitchFamily="18" charset="0"/>
+                        </a:rPr>
                         <m:t>∗</m:t>
                       </m:r>
                       <m:r>
                         <m:rPr>
                           <m:nor/>
                         </m:rPr>
-                        <a:rPr lang="en-US" dirty="0"/>
+                        <a:rPr lang="en-US" dirty="0">
+                          <a:latin typeface="Cambria Math" panose="02040503050406030204" pitchFamily="18" charset="0"/>
+                        </a:rPr>
                         <m:t>sin</m:t>
                       </m:r>
                       <m:r>
                         <m:rPr>
                           <m:nor/>
                         </m:rPr>
-                        <a:rPr lang="en-US" dirty="0"/>
+                        <a:rPr lang="en-US" dirty="0">
+                          <a:latin typeface="Cambria Math" panose="02040503050406030204" pitchFamily="18" charset="0"/>
+                        </a:rPr>
                         <m:t>(</m:t>
                       </m:r>
                       <m:r>
                         <m:rPr>
                           <m:nor/>
                         </m:rPr>
-                        <a:rPr lang="en-US" dirty="0"/>
+                        <a:rPr lang="en-US" dirty="0">
+                          <a:latin typeface="Cambria Math" panose="02040503050406030204" pitchFamily="18" charset="0"/>
+                        </a:rPr>
                         <m:t>tb</m:t>
                       </m:r>
                       <m:r>
                         <m:rPr>
                           <m:nor/>
                         </m:rPr>
-                        <a:rPr lang="en-US" dirty="0"/>
+                        <a:rPr lang="en-US" dirty="0">
+                          <a:latin typeface="Cambria Math" panose="02040503050406030204" pitchFamily="18" charset="0"/>
+                        </a:rPr>
                         <m:t>) − </m:t>
                       </m:r>
                       <m:r>
                         <m:rPr>
                           <m:nor/>
                         </m:rPr>
-                        <a:rPr lang="en-US" dirty="0"/>
+                        <a:rPr lang="en-US" dirty="0">
+                          <a:latin typeface="Cambria Math" panose="02040503050406030204" pitchFamily="18" charset="0"/>
+                        </a:rPr>
                         <m:t>LK</m:t>
                       </m:r>
                       <m:r>
                         <m:rPr>
                           <m:nor/>
                         </m:rPr>
-                        <a:rPr lang="en-US" dirty="0"/>
+                        <a:rPr lang="en-US" dirty="0">
+                          <a:latin typeface="Cambria Math" panose="02040503050406030204" pitchFamily="18" charset="0"/>
+                        </a:rPr>
                         <m:t>4∗</m:t>
                       </m:r>
                       <m:r>
                         <m:rPr>
                           <m:nor/>
                         </m:rPr>
-                        <a:rPr lang="en-US" dirty="0"/>
+                        <a:rPr lang="en-US" dirty="0">
+                          <a:latin typeface="Cambria Math" panose="02040503050406030204" pitchFamily="18" charset="0"/>
+                        </a:rPr>
                         <m:t>th</m:t>
                       </m:r>
                       <m:r>
                         <m:rPr>
                           <m:nor/>
                         </m:rPr>
-                        <a:rPr lang="en-US" dirty="0"/>
+                        <a:rPr lang="en-US" dirty="0">
+                          <a:latin typeface="Cambria Math" panose="02040503050406030204" pitchFamily="18" charset="0"/>
+                        </a:rPr>
                         <m:t>4</m:t>
                       </m:r>
                       <m:r>
                         <m:rPr>
                           <m:nor/>
                         </m:rPr>
-                        <a:rPr lang="en-US" dirty="0"/>
+                        <a:rPr lang="en-US" dirty="0">
+                          <a:latin typeface="Cambria Math" panose="02040503050406030204" pitchFamily="18" charset="0"/>
+                        </a:rPr>
                         <m:t>ddot</m:t>
                       </m:r>
                       <m:r>
                         <m:rPr>
                           <m:nor/>
                         </m:rPr>
-                        <a:rPr lang="en-US" dirty="0"/>
+                        <a:rPr lang="en-US" dirty="0">
+                          <a:latin typeface="Cambria Math" panose="02040503050406030204" pitchFamily="18" charset="0"/>
+                        </a:rPr>
                         <m:t>∗</m:t>
                       </m:r>
                       <m:r>
                         <m:rPr>
                           <m:nor/>
                         </m:rPr>
-                        <a:rPr lang="en-US" dirty="0"/>
+                        <a:rPr lang="en-US" dirty="0">
+                          <a:latin typeface="Cambria Math" panose="02040503050406030204" pitchFamily="18" charset="0"/>
+                        </a:rPr>
                         <m:t>sin</m:t>
                       </m:r>
                       <m:r>
                         <m:rPr>
                           <m:nor/>
                         </m:rPr>
-                        <a:rPr lang="en-US" dirty="0"/>
+                        <a:rPr lang="en-US" dirty="0">
+                          <a:latin typeface="Cambria Math" panose="02040503050406030204" pitchFamily="18" charset="0"/>
+                        </a:rPr>
                         <m:t>(</m:t>
                       </m:r>
                       <m:r>
                         <m:rPr>
                           <m:nor/>
                         </m:rPr>
-                        <a:rPr lang="en-US" dirty="0"/>
+                        <a:rPr lang="en-US" dirty="0">
+                          <a:latin typeface="Cambria Math" panose="02040503050406030204" pitchFamily="18" charset="0"/>
+                        </a:rPr>
                         <m:t>th</m:t>
                       </m:r>
                       <m:r>
                         <m:rPr>
                           <m:nor/>
                         </m:rPr>
-                        <a:rPr lang="en-US" dirty="0"/>
+                        <a:rPr lang="en-US" dirty="0">
+                          <a:latin typeface="Cambria Math" panose="02040503050406030204" pitchFamily="18" charset="0"/>
+                        </a:rPr>
                         <m:t>4) − </m:t>
                       </m:r>
                       <m:r>
                         <m:rPr>
                           <m:nor/>
                         </m:rPr>
-                        <a:rPr lang="en-US" dirty="0"/>
+                        <a:rPr lang="en-US" dirty="0">
+                          <a:latin typeface="Cambria Math" panose="02040503050406030204" pitchFamily="18" charset="0"/>
+                        </a:rPr>
                         <m:t>S</m:t>
                       </m:r>
                       <m:r>
                         <m:rPr>
                           <m:nor/>
                         </m:rPr>
-                        <a:rPr lang="en-US" dirty="0"/>
+                        <a:rPr lang="en-US" dirty="0">
+                          <a:latin typeface="Cambria Math" panose="02040503050406030204" pitchFamily="18" charset="0"/>
+                        </a:rPr>
                         <m:t>4∗</m:t>
                       </m:r>
                       <m:r>
                         <m:rPr>
                           <m:nor/>
                         </m:rPr>
-                        <a:rPr lang="en-US" dirty="0"/>
+                        <a:rPr lang="en-US" dirty="0">
+                          <a:latin typeface="Cambria Math" panose="02040503050406030204" pitchFamily="18" charset="0"/>
+                        </a:rPr>
                         <m:t>tk</m:t>
                       </m:r>
                       <m:r>
                         <m:rPr>
                           <m:nor/>
                         </m:rPr>
-                        <a:rPr lang="en-US" dirty="0"/>
+                        <a:rPr lang="en-US" dirty="0">
+                          <a:latin typeface="Cambria Math" panose="02040503050406030204" pitchFamily="18" charset="0"/>
+                        </a:rPr>
                         <m:t>4</m:t>
                       </m:r>
                       <m:r>
                         <m:rPr>
                           <m:nor/>
                         </m:rPr>
-                        <a:rPr lang="en-US" dirty="0"/>
+                        <a:rPr lang="en-US" dirty="0">
+                          <a:latin typeface="Cambria Math" panose="02040503050406030204" pitchFamily="18" charset="0"/>
+                        </a:rPr>
                         <m:t>ddot</m:t>
                       </m:r>
                       <m:r>
                         <m:rPr>
                           <m:nor/>
                         </m:rPr>
-                        <a:rPr lang="en-US" dirty="0"/>
+                        <a:rPr lang="en-US" dirty="0">
+                          <a:latin typeface="Cambria Math" panose="02040503050406030204" pitchFamily="18" charset="0"/>
+                        </a:rPr>
                         <m:t>∗</m:t>
                       </m:r>
                       <m:r>
                         <m:rPr>
                           <m:nor/>
                         </m:rPr>
-                        <a:rPr lang="en-US" dirty="0"/>
+                        <a:rPr lang="en-US" dirty="0">
+                          <a:latin typeface="Cambria Math" panose="02040503050406030204" pitchFamily="18" charset="0"/>
+                        </a:rPr>
                         <m:t>sin</m:t>
                       </m:r>
                       <m:r>
                         <m:rPr>
                           <m:nor/>
                         </m:rPr>
-                        <a:rPr lang="en-US" dirty="0"/>
+                        <a:rPr lang="en-US" dirty="0">
+                          <a:latin typeface="Cambria Math" panose="02040503050406030204" pitchFamily="18" charset="0"/>
+                        </a:rPr>
                         <m:t>(</m:t>
                       </m:r>
                       <m:r>
                         <m:rPr>
                           <m:nor/>
                         </m:rPr>
-                        <a:rPr lang="en-US" dirty="0"/>
+                        <a:rPr lang="en-US" dirty="0">
+                          <a:latin typeface="Cambria Math" panose="02040503050406030204" pitchFamily="18" charset="0"/>
+                        </a:rPr>
                         <m:t>tk</m:t>
                       </m:r>
                       <m:r>
                         <m:rPr>
                           <m:nor/>
                         </m:rPr>
-                        <a:rPr lang="en-US" dirty="0"/>
+                        <a:rPr lang="en-US" dirty="0">
+                          <a:latin typeface="Cambria Math" panose="02040503050406030204" pitchFamily="18" charset="0"/>
+                        </a:rPr>
                         <m:t>4)</m:t>
                       </m:r>
                     </m:oMath>
                   </m:oMathPara>
                 </a14:m>
-                <a:endParaRPr lang="en-US" dirty="0"/>
+                <a:endParaRPr lang="en-US" dirty="0">
+                  <a:latin typeface="Cambria Math" panose="02040503050406030204" pitchFamily="18" charset="0"/>
+                </a:endParaRPr>
               </a:p>
             </p:txBody>
           </p:sp>
         </mc:Choice>
-        <mc:Fallback xmlns="">
+        <mc:Fallback>
           <p:sp>
             <p:nvSpPr>
-              <p:cNvPr id="3" name="Content Placeholder 2"/>
-              <p:cNvSpPr>
-                <a:spLocks noGrp="1" noRot="1" noChangeAspect="1" noMove="1" noResize="1" noEditPoints="1" noAdjustHandles="1" noChangeArrowheads="1" noChangeShapeType="1" noTextEdit="1"/>
+              <p:cNvPr id="10" name="Content Placeholder 2"/>
+              <p:cNvSpPr txBox="1">
+                <a:spLocks noRot="1" noChangeAspect="1" noMove="1" noResize="1" noEditPoints="1" noAdjustHandles="1" noChangeArrowheads="1" noChangeShapeType="1" noTextEdit="1"/>
               </p:cNvSpPr>
-              <p:nvPr>
-                <p:ph idx="1"/>
-              </p:nvPr>
+              <p:nvPr/>
             </p:nvSpPr>
             <p:spPr>
               <a:xfrm>
                 <a:off x="1141413" y="2249486"/>
                 <a:ext cx="4274650" cy="4212859"/>
               </a:xfrm>
+              <a:prstGeom prst="rect">
+                <a:avLst/>
+              </a:prstGeom>
               <a:blipFill rotWithShape="0">
                 <a:blip r:embed="rId2"/>
                 <a:stretch>
@@ -14833,6 +14950,13 @@
   <p:clrMapOvr>
     <a:masterClrMapping/>
   </p:clrMapOvr>
+  <p:timing>
+    <p:tnLst>
+      <p:par>
+        <p:cTn id="1" dur="indefinite" restart="never" nodeType="tmRoot"/>
+      </p:par>
+    </p:tnLst>
+  </p:timing>
 </p:sld>
 </file>
 
@@ -14923,6 +15047,13 @@
   <p:clrMapOvr>
     <a:masterClrMapping/>
   </p:clrMapOvr>
+  <p:timing>
+    <p:tnLst>
+      <p:par>
+        <p:cTn id="1" dur="indefinite" restart="never" nodeType="tmRoot"/>
+      </p:par>
+    </p:tnLst>
+  </p:timing>
 </p:sld>
 </file>
 
@@ -15054,6 +15185,13 @@
   <p:clrMapOvr>
     <a:masterClrMapping/>
   </p:clrMapOvr>
+  <p:timing>
+    <p:tnLst>
+      <p:par>
+        <p:cTn id="1" dur="indefinite" restart="never" nodeType="tmRoot"/>
+      </p:par>
+    </p:tnLst>
+  </p:timing>
 </p:sld>
 </file>
 
@@ -15225,6 +15363,13 @@
   <p:clrMapOvr>
     <a:masterClrMapping/>
   </p:clrMapOvr>
+  <p:timing>
+    <p:tnLst>
+      <p:par>
+        <p:cTn id="1" dur="indefinite" restart="never" nodeType="tmRoot"/>
+      </p:par>
+    </p:tnLst>
+  </p:timing>
 </p:sld>
 </file>
 

</xml_diff>